<commit_message>
modificando os artefatos 15, 16, 17, 18 conforme o mostrado pelo professor
</commit_message>
<xml_diff>
--- a/15 - Arquitetura de Negócio para cada Cenário.pptx
+++ b/15 - Arquitetura de Negócio para cada Cenário.pptx
@@ -8,7 +8,8 @@
     <p:sldId id="256" r:id="rId2"/>
     <p:sldId id="259" r:id="rId3"/>
     <p:sldId id="260" r:id="rId4"/>
-    <p:sldId id="262" r:id="rId5"/>
+    <p:sldId id="263" r:id="rId5"/>
+    <p:sldId id="262" r:id="rId6"/>
   </p:sldIdLst>
   <p:sldSz cx="12192000" cy="6858000"/>
   <p:notesSz cx="6858000" cy="9144000"/>
@@ -118,7 +119,7 @@
 <file path=ppt/revisionInfo.xml><?xml version="1.0" encoding="utf-8"?>
 <p1510:revInfo xmlns:a="http://schemas.openxmlformats.org/drawingml/2006/main" xmlns:r="http://schemas.openxmlformats.org/officeDocument/2006/relationships" xmlns:p1510="http://schemas.microsoft.com/office/powerpoint/2015/10/main">
   <p1510:revLst>
-    <p1510:client id="{5B1E469C-F239-492F-80B7-1413FE53DC7D}" v="6" dt="2020-09-05T02:17:10.395"/>
+    <p1510:client id="{476E1928-039A-4135-8C1B-57828C9CB4C7}" v="3" dt="2020-09-24T00:14:38.201"/>
   </p1510:revLst>
 </p1510:revInfo>
 </file>
@@ -496,6 +497,140 @@
       </pc:sldChg>
     </pc:docChg>
   </pc:docChgLst>
+  <pc:docChgLst>
+    <pc:chgData name="Rafael Izukawa" userId="8cd3af5bce398e7e" providerId="LiveId" clId="{476E1928-039A-4135-8C1B-57828C9CB4C7}"/>
+    <pc:docChg chg="undo custSel addSld modSld sldOrd">
+      <pc:chgData name="Rafael Izukawa" userId="8cd3af5bce398e7e" providerId="LiveId" clId="{476E1928-039A-4135-8C1B-57828C9CB4C7}" dt="2020-09-24T00:15:46.850" v="192" actId="1076"/>
+      <pc:docMkLst>
+        <pc:docMk/>
+      </pc:docMkLst>
+      <pc:sldChg chg="modSp mod">
+        <pc:chgData name="Rafael Izukawa" userId="8cd3af5bce398e7e" providerId="LiveId" clId="{476E1928-039A-4135-8C1B-57828C9CB4C7}" dt="2020-09-24T00:13:25.480" v="135" actId="313"/>
+        <pc:sldMkLst>
+          <pc:docMk/>
+          <pc:sldMk cId="2183159773" sldId="256"/>
+        </pc:sldMkLst>
+        <pc:spChg chg="mod">
+          <ac:chgData name="Rafael Izukawa" userId="8cd3af5bce398e7e" providerId="LiveId" clId="{476E1928-039A-4135-8C1B-57828C9CB4C7}" dt="2020-09-24T00:13:25.480" v="135" actId="313"/>
+          <ac:spMkLst>
+            <pc:docMk/>
+            <pc:sldMk cId="2183159773" sldId="256"/>
+            <ac:spMk id="11" creationId="{B6B4BCA4-07F0-400A-86F4-51294545DC5D}"/>
+          </ac:spMkLst>
+        </pc:spChg>
+      </pc:sldChg>
+      <pc:sldChg chg="delSp modSp mod">
+        <pc:chgData name="Rafael Izukawa" userId="8cd3af5bce398e7e" providerId="LiveId" clId="{476E1928-039A-4135-8C1B-57828C9CB4C7}" dt="2020-09-24T00:15:46.850" v="192" actId="1076"/>
+        <pc:sldMkLst>
+          <pc:docMk/>
+          <pc:sldMk cId="2692459707" sldId="260"/>
+        </pc:sldMkLst>
+        <pc:spChg chg="del mod">
+          <ac:chgData name="Rafael Izukawa" userId="8cd3af5bce398e7e" providerId="LiveId" clId="{476E1928-039A-4135-8C1B-57828C9CB4C7}" dt="2020-09-24T00:13:46.377" v="138" actId="21"/>
+          <ac:spMkLst>
+            <pc:docMk/>
+            <pc:sldMk cId="2692459707" sldId="260"/>
+            <ac:spMk id="2" creationId="{DB65EEED-3FC7-4953-BD9B-1BE0132B272B}"/>
+          </ac:spMkLst>
+        </pc:spChg>
+        <pc:spChg chg="mod">
+          <ac:chgData name="Rafael Izukawa" userId="8cd3af5bce398e7e" providerId="LiveId" clId="{476E1928-039A-4135-8C1B-57828C9CB4C7}" dt="2020-09-24T00:15:46.850" v="192" actId="1076"/>
+          <ac:spMkLst>
+            <pc:docMk/>
+            <pc:sldMk cId="2692459707" sldId="260"/>
+            <ac:spMk id="13" creationId="{A9EE9E26-6BDB-40E3-AC86-DC7876C4BC17}"/>
+          </ac:spMkLst>
+        </pc:spChg>
+        <pc:cxnChg chg="mod">
+          <ac:chgData name="Rafael Izukawa" userId="8cd3af5bce398e7e" providerId="LiveId" clId="{476E1928-039A-4135-8C1B-57828C9CB4C7}" dt="2020-09-24T00:15:46.850" v="192" actId="1076"/>
+          <ac:cxnSpMkLst>
+            <pc:docMk/>
+            <pc:sldMk cId="2692459707" sldId="260"/>
+            <ac:cxnSpMk id="11" creationId="{D4D9CDDE-B2E6-4BC7-AFD6-27C12CDDBFAF}"/>
+          </ac:cxnSpMkLst>
+        </pc:cxnChg>
+        <pc:cxnChg chg="del mod">
+          <ac:chgData name="Rafael Izukawa" userId="8cd3af5bce398e7e" providerId="LiveId" clId="{476E1928-039A-4135-8C1B-57828C9CB4C7}" dt="2020-09-24T00:13:48.522" v="139" actId="478"/>
+          <ac:cxnSpMkLst>
+            <pc:docMk/>
+            <pc:sldMk cId="2692459707" sldId="260"/>
+            <ac:cxnSpMk id="14" creationId="{95039765-6875-4DE2-9C6C-43927750AC07}"/>
+          </ac:cxnSpMkLst>
+        </pc:cxnChg>
+      </pc:sldChg>
+      <pc:sldChg chg="addSp delSp modSp add mod ord">
+        <pc:chgData name="Rafael Izukawa" userId="8cd3af5bce398e7e" providerId="LiveId" clId="{476E1928-039A-4135-8C1B-57828C9CB4C7}" dt="2020-09-24T00:15:38.736" v="191" actId="20577"/>
+        <pc:sldMkLst>
+          <pc:docMk/>
+          <pc:sldMk cId="2737864566" sldId="263"/>
+        </pc:sldMkLst>
+        <pc:spChg chg="add mod">
+          <ac:chgData name="Rafael Izukawa" userId="8cd3af5bce398e7e" providerId="LiveId" clId="{476E1928-039A-4135-8C1B-57828C9CB4C7}" dt="2020-09-24T00:14:13.687" v="148" actId="1076"/>
+          <ac:spMkLst>
+            <pc:docMk/>
+            <pc:sldMk cId="2737864566" sldId="263"/>
+            <ac:spMk id="2" creationId="{34E3AD1B-CCC7-417F-835E-46956F90ED36}"/>
+          </ac:spMkLst>
+        </pc:spChg>
+        <pc:spChg chg="mod">
+          <ac:chgData name="Rafael Izukawa" userId="8cd3af5bce398e7e" providerId="LiveId" clId="{476E1928-039A-4135-8C1B-57828C9CB4C7}" dt="2020-09-24T00:15:38.736" v="191" actId="20577"/>
+          <ac:spMkLst>
+            <pc:docMk/>
+            <pc:sldMk cId="2737864566" sldId="263"/>
+            <ac:spMk id="3" creationId="{688AB69A-7733-4066-B3E4-0079EF75AA0F}"/>
+          </ac:spMkLst>
+        </pc:spChg>
+        <pc:spChg chg="mod">
+          <ac:chgData name="Rafael Izukawa" userId="8cd3af5bce398e7e" providerId="LiveId" clId="{476E1928-039A-4135-8C1B-57828C9CB4C7}" dt="2020-09-24T00:14:04.290" v="144" actId="1076"/>
+          <ac:spMkLst>
+            <pc:docMk/>
+            <pc:sldMk cId="2737864566" sldId="263"/>
+            <ac:spMk id="4" creationId="{475C5851-AADE-41EF-8B88-9899E913415B}"/>
+          </ac:spMkLst>
+        </pc:spChg>
+        <pc:spChg chg="mod">
+          <ac:chgData name="Rafael Izukawa" userId="8cd3af5bce398e7e" providerId="LiveId" clId="{476E1928-039A-4135-8C1B-57828C9CB4C7}" dt="2020-09-24T00:13:18.850" v="134" actId="20577"/>
+          <ac:spMkLst>
+            <pc:docMk/>
+            <pc:sldMk cId="2737864566" sldId="263"/>
+            <ac:spMk id="7" creationId="{978728DB-A665-42A7-A4F1-F4D368DB5FAF}"/>
+          </ac:spMkLst>
+        </pc:spChg>
+        <pc:spChg chg="add mod">
+          <ac:chgData name="Rafael Izukawa" userId="8cd3af5bce398e7e" providerId="LiveId" clId="{476E1928-039A-4135-8C1B-57828C9CB4C7}" dt="2020-09-24T00:15:09.979" v="187" actId="20577"/>
+          <ac:spMkLst>
+            <pc:docMk/>
+            <pc:sldMk cId="2737864566" sldId="263"/>
+            <ac:spMk id="11" creationId="{DB0D236C-3476-4EA5-8F13-60708BB330A7}"/>
+          </ac:spMkLst>
+        </pc:spChg>
+        <pc:spChg chg="del">
+          <ac:chgData name="Rafael Izukawa" userId="8cd3af5bce398e7e" providerId="LiveId" clId="{476E1928-039A-4135-8C1B-57828C9CB4C7}" dt="2020-09-24T00:13:52.894" v="140" actId="478"/>
+          <ac:spMkLst>
+            <pc:docMk/>
+            <pc:sldMk cId="2737864566" sldId="263"/>
+            <ac:spMk id="13" creationId="{A9EE9E26-6BDB-40E3-AC86-DC7876C4BC17}"/>
+          </ac:spMkLst>
+        </pc:spChg>
+        <pc:cxnChg chg="mod">
+          <ac:chgData name="Rafael Izukawa" userId="8cd3af5bce398e7e" providerId="LiveId" clId="{476E1928-039A-4135-8C1B-57828C9CB4C7}" dt="2020-09-24T00:14:16.301" v="149" actId="14100"/>
+          <ac:cxnSpMkLst>
+            <pc:docMk/>
+            <pc:sldMk cId="2737864566" sldId="263"/>
+            <ac:cxnSpMk id="14" creationId="{9DD8FF18-3AE4-4D59-AF72-AF5FB9F567B3}"/>
+          </ac:cxnSpMkLst>
+        </pc:cxnChg>
+        <pc:cxnChg chg="add mod">
+          <ac:chgData name="Rafael Izukawa" userId="8cd3af5bce398e7e" providerId="LiveId" clId="{476E1928-039A-4135-8C1B-57828C9CB4C7}" dt="2020-09-24T00:14:42.501" v="154" actId="14100"/>
+          <ac:cxnSpMkLst>
+            <pc:docMk/>
+            <pc:sldMk cId="2737864566" sldId="263"/>
+            <ac:cxnSpMk id="16" creationId="{03D27943-87D3-43D8-A0B6-AD00FA5A6010}"/>
+          </ac:cxnSpMkLst>
+        </pc:cxnChg>
+      </pc:sldChg>
+    </pc:docChg>
+  </pc:docChgLst>
 </pc:chgInfo>
 </file>
 
@@ -646,7 +781,7 @@
           <a:p>
             <a:fld id="{E5032764-77C1-4722-B4BE-181502081668}" type="datetimeFigureOut">
               <a:rPr lang="pt-BR" smtClean="0"/>
-              <a:t>17/09/2020</a:t>
+              <a:t>23/09/2020</a:t>
             </a:fld>
             <a:endParaRPr lang="pt-BR"/>
           </a:p>
@@ -844,7 +979,7 @@
           <a:p>
             <a:fld id="{E5032764-77C1-4722-B4BE-181502081668}" type="datetimeFigureOut">
               <a:rPr lang="pt-BR" smtClean="0"/>
-              <a:t>17/09/2020</a:t>
+              <a:t>23/09/2020</a:t>
             </a:fld>
             <a:endParaRPr lang="pt-BR"/>
           </a:p>
@@ -1052,7 +1187,7 @@
           <a:p>
             <a:fld id="{E5032764-77C1-4722-B4BE-181502081668}" type="datetimeFigureOut">
               <a:rPr lang="pt-BR" smtClean="0"/>
-              <a:t>17/09/2020</a:t>
+              <a:t>23/09/2020</a:t>
             </a:fld>
             <a:endParaRPr lang="pt-BR"/>
           </a:p>
@@ -1250,7 +1385,7 @@
           <a:p>
             <a:fld id="{E5032764-77C1-4722-B4BE-181502081668}" type="datetimeFigureOut">
               <a:rPr lang="pt-BR" smtClean="0"/>
-              <a:t>17/09/2020</a:t>
+              <a:t>23/09/2020</a:t>
             </a:fld>
             <a:endParaRPr lang="pt-BR"/>
           </a:p>
@@ -1525,7 +1660,7 @@
           <a:p>
             <a:fld id="{E5032764-77C1-4722-B4BE-181502081668}" type="datetimeFigureOut">
               <a:rPr lang="pt-BR" smtClean="0"/>
-              <a:t>17/09/2020</a:t>
+              <a:t>23/09/2020</a:t>
             </a:fld>
             <a:endParaRPr lang="pt-BR"/>
           </a:p>
@@ -1790,7 +1925,7 @@
           <a:p>
             <a:fld id="{E5032764-77C1-4722-B4BE-181502081668}" type="datetimeFigureOut">
               <a:rPr lang="pt-BR" smtClean="0"/>
-              <a:t>17/09/2020</a:t>
+              <a:t>23/09/2020</a:t>
             </a:fld>
             <a:endParaRPr lang="pt-BR"/>
           </a:p>
@@ -2202,7 +2337,7 @@
           <a:p>
             <a:fld id="{E5032764-77C1-4722-B4BE-181502081668}" type="datetimeFigureOut">
               <a:rPr lang="pt-BR" smtClean="0"/>
-              <a:t>17/09/2020</a:t>
+              <a:t>23/09/2020</a:t>
             </a:fld>
             <a:endParaRPr lang="pt-BR"/>
           </a:p>
@@ -2343,7 +2478,7 @@
           <a:p>
             <a:fld id="{E5032764-77C1-4722-B4BE-181502081668}" type="datetimeFigureOut">
               <a:rPr lang="pt-BR" smtClean="0"/>
-              <a:t>17/09/2020</a:t>
+              <a:t>23/09/2020</a:t>
             </a:fld>
             <a:endParaRPr lang="pt-BR"/>
           </a:p>
@@ -2456,7 +2591,7 @@
           <a:p>
             <a:fld id="{E5032764-77C1-4722-B4BE-181502081668}" type="datetimeFigureOut">
               <a:rPr lang="pt-BR" smtClean="0"/>
-              <a:t>17/09/2020</a:t>
+              <a:t>23/09/2020</a:t>
             </a:fld>
             <a:endParaRPr lang="pt-BR"/>
           </a:p>
@@ -2767,7 +2902,7 @@
           <a:p>
             <a:fld id="{E5032764-77C1-4722-B4BE-181502081668}" type="datetimeFigureOut">
               <a:rPr lang="pt-BR" smtClean="0"/>
-              <a:t>17/09/2020</a:t>
+              <a:t>23/09/2020</a:t>
             </a:fld>
             <a:endParaRPr lang="pt-BR"/>
           </a:p>
@@ -3055,7 +3190,7 @@
           <a:p>
             <a:fld id="{E5032764-77C1-4722-B4BE-181502081668}" type="datetimeFigureOut">
               <a:rPr lang="pt-BR" smtClean="0"/>
-              <a:t>17/09/2020</a:t>
+              <a:t>23/09/2020</a:t>
             </a:fld>
             <a:endParaRPr lang="pt-BR"/>
           </a:p>
@@ -3296,7 +3431,7 @@
           <a:p>
             <a:fld id="{E5032764-77C1-4722-B4BE-181502081668}" type="datetimeFigureOut">
               <a:rPr lang="pt-BR" smtClean="0"/>
-              <a:t>17/09/2020</a:t>
+              <a:t>23/09/2020</a:t>
             </a:fld>
             <a:endParaRPr lang="pt-BR"/>
           </a:p>
@@ -3935,7 +4070,7 @@
         <p:spPr>
           <a:xfrm>
             <a:off x="3786330" y="2617644"/>
-            <a:ext cx="2404745" cy="1754326"/>
+            <a:ext cx="2404745" cy="2308324"/>
           </a:xfrm>
           <a:prstGeom prst="rect">
             <a:avLst/>
@@ -3979,7 +4114,14 @@
               <a:buFont typeface="+mj-lt"/>
               <a:buAutoNum type="arabicPeriod"/>
             </a:pPr>
-            <a:endParaRPr lang="pt-BR" dirty="0"/>
+            <a:r>
+              <a:rPr lang="pt-BR" dirty="0"/>
+              <a:t>Devolver</a:t>
+            </a:r>
+            <a:r>
+              <a:rPr lang="pt-BR" sz="1800" dirty="0"/>
+              <a:t> produto e pegar o dinheiro de volta</a:t>
+            </a:r>
           </a:p>
           <a:p>
             <a:pPr marL="342900" indent="-342900">
@@ -4749,7 +4891,7 @@
         </p:nvSpPr>
         <p:spPr>
           <a:xfrm>
-            <a:off x="7611551" y="4772914"/>
+            <a:off x="7999952" y="4772914"/>
             <a:ext cx="1278446" cy="538383"/>
           </a:xfrm>
           <a:prstGeom prst="roundRect">
@@ -4826,9 +4968,9 @@
           <p:nvPr/>
         </p:nvCxnSpPr>
         <p:spPr>
-          <a:xfrm flipH="1">
-            <a:off x="8250774" y="4025896"/>
-            <a:ext cx="388401" cy="747018"/>
+          <a:xfrm>
+            <a:off x="8639175" y="4025896"/>
+            <a:ext cx="0" cy="747018"/>
           </a:xfrm>
           <a:prstGeom prst="line">
             <a:avLst/>
@@ -4850,12 +4992,42 @@
           </a:fontRef>
         </p:style>
       </p:cxnSp>
-      <p:sp>
-        <p:nvSpPr>
-          <p:cNvPr id="2" name="Retângulo de cantos arredondados 111">
-            <a:extLst>
-              <a:ext uri="{FF2B5EF4-FFF2-40B4-BE49-F238E27FC236}">
-                <a16:creationId xmlns:a16="http://schemas.microsoft.com/office/drawing/2014/main" id="{DB65EEED-3FC7-4953-BD9B-1BE0132B272B}"/>
+    </p:spTree>
+    <p:extLst>
+      <p:ext uri="{BB962C8B-B14F-4D97-AF65-F5344CB8AC3E}">
+        <p14:creationId xmlns:p14="http://schemas.microsoft.com/office/powerpoint/2010/main" val="2692459707"/>
+      </p:ext>
+    </p:extLst>
+  </p:cSld>
+  <p:clrMapOvr>
+    <a:masterClrMapping/>
+  </p:clrMapOvr>
+</p:sld>
+</file>
+
+<file path=ppt/slides/slide4.xml><?xml version="1.0" encoding="utf-8"?>
+<p:sld xmlns:a="http://schemas.openxmlformats.org/drawingml/2006/main" xmlns:r="http://schemas.openxmlformats.org/officeDocument/2006/relationships" xmlns:p="http://schemas.openxmlformats.org/presentationml/2006/main">
+  <p:cSld>
+    <p:spTree>
+      <p:nvGrpSpPr>
+        <p:cNvPr id="1" name=""/>
+        <p:cNvGrpSpPr/>
+        <p:nvPr/>
+      </p:nvGrpSpPr>
+      <p:grpSpPr>
+        <a:xfrm>
+          <a:off x="0" y="0"/>
+          <a:ext cx="0" cy="0"/>
+          <a:chOff x="0" y="0"/>
+          <a:chExt cx="0" cy="0"/>
+        </a:xfrm>
+      </p:grpSpPr>
+      <p:sp>
+        <p:nvSpPr>
+          <p:cNvPr id="4" name="Retângulo: Cantos Arredondados 3">
+            <a:extLst>
+              <a:ext uri="{FF2B5EF4-FFF2-40B4-BE49-F238E27FC236}">
+                <a16:creationId xmlns:a16="http://schemas.microsoft.com/office/drawing/2014/main" id="{475C5851-AADE-41EF-8B88-9899E913415B}"/>
               </a:ext>
             </a:extLst>
           </p:cNvPr>
@@ -4864,7 +5036,334 @@
         </p:nvSpPr>
         <p:spPr>
           <a:xfrm>
-            <a:off x="9116074" y="4706639"/>
+            <a:off x="5994400" y="1092200"/>
+            <a:ext cx="5588000" cy="4965700"/>
+          </a:xfrm>
+          <a:prstGeom prst="roundRect">
+            <a:avLst/>
+          </a:prstGeom>
+          <a:ln>
+            <a:solidFill>
+              <a:schemeClr val="tx2"/>
+            </a:solidFill>
+          </a:ln>
+        </p:spPr>
+        <p:style>
+          <a:lnRef idx="2">
+            <a:schemeClr val="accent6"/>
+          </a:lnRef>
+          <a:fillRef idx="1">
+            <a:schemeClr val="lt1"/>
+          </a:fillRef>
+          <a:effectRef idx="0">
+            <a:schemeClr val="accent6"/>
+          </a:effectRef>
+          <a:fontRef idx="minor">
+            <a:schemeClr val="dk1"/>
+          </a:fontRef>
+        </p:style>
+        <p:txBody>
+          <a:bodyPr rtlCol="0" anchor="ctr"/>
+          <a:lstStyle/>
+          <a:p>
+            <a:pPr algn="ctr"/>
+            <a:endParaRPr lang="pt-BR" dirty="0"/>
+          </a:p>
+        </p:txBody>
+      </p:sp>
+      <p:sp>
+        <p:nvSpPr>
+          <p:cNvPr id="5" name="CaixaDeTexto 4">
+            <a:extLst>
+              <a:ext uri="{FF2B5EF4-FFF2-40B4-BE49-F238E27FC236}">
+                <a16:creationId xmlns:a16="http://schemas.microsoft.com/office/drawing/2014/main" id="{C357E3AF-EC38-4CD3-A612-7830FD191126}"/>
+              </a:ext>
+            </a:extLst>
+          </p:cNvPr>
+          <p:cNvSpPr txBox="1"/>
+          <p:nvPr/>
+        </p:nvSpPr>
+        <p:spPr>
+          <a:xfrm>
+            <a:off x="8104302" y="1270000"/>
+            <a:ext cx="1368195" cy="523220"/>
+          </a:xfrm>
+          <a:prstGeom prst="rect">
+            <a:avLst/>
+          </a:prstGeom>
+          <a:noFill/>
+        </p:spPr>
+        <p:txBody>
+          <a:bodyPr wrap="none" rtlCol="0">
+            <a:spAutoFit/>
+          </a:bodyPr>
+          <a:lstStyle/>
+          <a:p>
+            <a:r>
+              <a:rPr lang="pt-BR" sz="2800" dirty="0"/>
+              <a:t>Petshop</a:t>
+            </a:r>
+          </a:p>
+        </p:txBody>
+      </p:sp>
+      <p:sp>
+        <p:nvSpPr>
+          <p:cNvPr id="6" name="Retângulo 5">
+            <a:extLst>
+              <a:ext uri="{FF2B5EF4-FFF2-40B4-BE49-F238E27FC236}">
+                <a16:creationId xmlns:a16="http://schemas.microsoft.com/office/drawing/2014/main" id="{C9B47CB3-75A2-49FA-90CE-334B0A1516C9}"/>
+              </a:ext>
+            </a:extLst>
+          </p:cNvPr>
+          <p:cNvSpPr/>
+          <p:nvPr/>
+        </p:nvSpPr>
+        <p:spPr>
+          <a:xfrm>
+            <a:off x="101600" y="2527300"/>
+            <a:ext cx="3352800" cy="1803400"/>
+          </a:xfrm>
+          <a:prstGeom prst="rect">
+            <a:avLst/>
+          </a:prstGeom>
+        </p:spPr>
+        <p:style>
+          <a:lnRef idx="2">
+            <a:schemeClr val="accent1">
+              <a:shade val="50000"/>
+            </a:schemeClr>
+          </a:lnRef>
+          <a:fillRef idx="1">
+            <a:schemeClr val="accent1"/>
+          </a:fillRef>
+          <a:effectRef idx="0">
+            <a:schemeClr val="accent1"/>
+          </a:effectRef>
+          <a:fontRef idx="minor">
+            <a:schemeClr val="lt1"/>
+          </a:fontRef>
+        </p:style>
+        <p:txBody>
+          <a:bodyPr rtlCol="0" anchor="ctr"/>
+          <a:lstStyle/>
+          <a:p>
+            <a:pPr algn="ctr"/>
+            <a:r>
+              <a:rPr lang="pt-BR" sz="3600" dirty="0"/>
+              <a:t>Cliente</a:t>
+            </a:r>
+          </a:p>
+        </p:txBody>
+      </p:sp>
+      <p:sp>
+        <p:nvSpPr>
+          <p:cNvPr id="7" name="CaixaDeTexto 6">
+            <a:extLst>
+              <a:ext uri="{FF2B5EF4-FFF2-40B4-BE49-F238E27FC236}">
+                <a16:creationId xmlns:a16="http://schemas.microsoft.com/office/drawing/2014/main" id="{978728DB-A665-42A7-A4F1-F4D368DB5FAF}"/>
+              </a:ext>
+            </a:extLst>
+          </p:cNvPr>
+          <p:cNvSpPr txBox="1"/>
+          <p:nvPr/>
+        </p:nvSpPr>
+        <p:spPr>
+          <a:xfrm>
+            <a:off x="25961" y="275957"/>
+            <a:ext cx="5576655" cy="1754326"/>
+          </a:xfrm>
+          <a:prstGeom prst="rect">
+            <a:avLst/>
+          </a:prstGeom>
+          <a:noFill/>
+        </p:spPr>
+        <p:txBody>
+          <a:bodyPr wrap="none" rtlCol="0">
+            <a:spAutoFit/>
+          </a:bodyPr>
+          <a:lstStyle/>
+          <a:p>
+            <a:r>
+              <a:rPr lang="pt-BR" sz="3600" dirty="0"/>
+              <a:t>Cenário: Devolver produto e </a:t>
+            </a:r>
+          </a:p>
+          <a:p>
+            <a:r>
+              <a:rPr lang="pt-BR" sz="3600" dirty="0"/>
+              <a:t>pegar o dinheiro de volta</a:t>
+            </a:r>
+          </a:p>
+          <a:p>
+            <a:endParaRPr lang="pt-BR" sz="3600" dirty="0"/>
+          </a:p>
+        </p:txBody>
+      </p:sp>
+      <p:cxnSp>
+        <p:nvCxnSpPr>
+          <p:cNvPr id="9" name="Conector reto 8">
+            <a:extLst>
+              <a:ext uri="{FF2B5EF4-FFF2-40B4-BE49-F238E27FC236}">
+                <a16:creationId xmlns:a16="http://schemas.microsoft.com/office/drawing/2014/main" id="{57D3F7AE-A087-4F22-8C61-AD0A7EEDCBD5}"/>
+              </a:ext>
+            </a:extLst>
+          </p:cNvPr>
+          <p:cNvCxnSpPr>
+            <a:cxnSpLocks/>
+            <a:stCxn id="6" idx="3"/>
+          </p:cNvCxnSpPr>
+          <p:nvPr/>
+        </p:nvCxnSpPr>
+        <p:spPr>
+          <a:xfrm>
+            <a:off x="3454400" y="3429000"/>
+            <a:ext cx="3873500" cy="0"/>
+          </a:xfrm>
+          <a:prstGeom prst="line">
+            <a:avLst/>
+          </a:prstGeom>
+          <a:ln w="12700"/>
+        </p:spPr>
+        <p:style>
+          <a:lnRef idx="1">
+            <a:schemeClr val="accent1"/>
+          </a:lnRef>
+          <a:fillRef idx="0">
+            <a:schemeClr val="accent1"/>
+          </a:fillRef>
+          <a:effectRef idx="0">
+            <a:schemeClr val="accent1"/>
+          </a:effectRef>
+          <a:fontRef idx="minor">
+            <a:schemeClr val="tx1"/>
+          </a:fontRef>
+        </p:style>
+      </p:cxnSp>
+      <p:sp>
+        <p:nvSpPr>
+          <p:cNvPr id="3" name="Cubo 2">
+            <a:extLst>
+              <a:ext uri="{FF2B5EF4-FFF2-40B4-BE49-F238E27FC236}">
+                <a16:creationId xmlns:a16="http://schemas.microsoft.com/office/drawing/2014/main" id="{688AB69A-7733-4066-B3E4-0079EF75AA0F}"/>
+              </a:ext>
+            </a:extLst>
+          </p:cNvPr>
+          <p:cNvSpPr/>
+          <p:nvPr/>
+        </p:nvSpPr>
+        <p:spPr>
+          <a:xfrm>
+            <a:off x="7340599" y="2832104"/>
+            <a:ext cx="2895600" cy="1193792"/>
+          </a:xfrm>
+          <a:prstGeom prst="cube">
+            <a:avLst/>
+          </a:prstGeom>
+          <a:solidFill>
+            <a:schemeClr val="accent4">
+              <a:lumMod val="75000"/>
+            </a:schemeClr>
+          </a:solidFill>
+        </p:spPr>
+        <p:style>
+          <a:lnRef idx="2">
+            <a:schemeClr val="accent1">
+              <a:shade val="50000"/>
+            </a:schemeClr>
+          </a:lnRef>
+          <a:fillRef idx="1">
+            <a:schemeClr val="accent1"/>
+          </a:fillRef>
+          <a:effectRef idx="0">
+            <a:schemeClr val="accent1"/>
+          </a:effectRef>
+          <a:fontRef idx="minor">
+            <a:schemeClr val="lt1"/>
+          </a:fontRef>
+        </p:style>
+        <p:txBody>
+          <a:bodyPr rtlCol="0" anchor="ctr"/>
+          <a:lstStyle/>
+          <a:p>
+            <a:pPr algn="ctr"/>
+            <a:r>
+              <a:rPr lang="pt-BR" dirty="0">
+                <a:solidFill>
+                  <a:schemeClr val="tx1"/>
+                </a:solidFill>
+              </a:rPr>
+              <a:t>Atendimento ao cliente</a:t>
+            </a:r>
+          </a:p>
+          <a:p>
+            <a:pPr algn="ctr"/>
+            <a:r>
+              <a:rPr lang="pt-BR" dirty="0">
+                <a:solidFill>
+                  <a:schemeClr val="tx1"/>
+                </a:solidFill>
+              </a:rPr>
+              <a:t>(nó operacional)</a:t>
+            </a:r>
+          </a:p>
+        </p:txBody>
+      </p:sp>
+      <p:cxnSp>
+        <p:nvCxnSpPr>
+          <p:cNvPr id="14" name="Conector reto 13">
+            <a:extLst>
+              <a:ext uri="{FF2B5EF4-FFF2-40B4-BE49-F238E27FC236}">
+                <a16:creationId xmlns:a16="http://schemas.microsoft.com/office/drawing/2014/main" id="{9DD8FF18-3AE4-4D59-AF72-AF5FB9F567B3}"/>
+              </a:ext>
+            </a:extLst>
+          </p:cNvPr>
+          <p:cNvCxnSpPr>
+            <a:cxnSpLocks/>
+            <a:stCxn id="2" idx="0"/>
+            <a:endCxn id="3" idx="3"/>
+          </p:cNvCxnSpPr>
+          <p:nvPr/>
+        </p:nvCxnSpPr>
+        <p:spPr>
+          <a:xfrm flipV="1">
+            <a:off x="8011998" y="4025896"/>
+            <a:ext cx="627177" cy="680536"/>
+          </a:xfrm>
+          <a:prstGeom prst="line">
+            <a:avLst/>
+          </a:prstGeom>
+          <a:ln w="12700"/>
+        </p:spPr>
+        <p:style>
+          <a:lnRef idx="1">
+            <a:schemeClr val="accent1"/>
+          </a:lnRef>
+          <a:fillRef idx="0">
+            <a:schemeClr val="accent1"/>
+          </a:fillRef>
+          <a:effectRef idx="0">
+            <a:schemeClr val="accent1"/>
+          </a:effectRef>
+          <a:fontRef idx="minor">
+            <a:schemeClr val="tx1"/>
+          </a:fontRef>
+        </p:style>
+      </p:cxnSp>
+      <p:sp>
+        <p:nvSpPr>
+          <p:cNvPr id="2" name="Retângulo de cantos arredondados 111">
+            <a:extLst>
+              <a:ext uri="{FF2B5EF4-FFF2-40B4-BE49-F238E27FC236}">
+                <a16:creationId xmlns:a16="http://schemas.microsoft.com/office/drawing/2014/main" id="{34E3AD1B-CCC7-417F-835E-46956F90ED36}"/>
+              </a:ext>
+            </a:extLst>
+          </p:cNvPr>
+          <p:cNvSpPr/>
+          <p:nvPr/>
+        </p:nvSpPr>
+        <p:spPr>
+          <a:xfrm>
+            <a:off x="7327900" y="4706432"/>
             <a:ext cx="1368195" cy="670931"/>
           </a:xfrm>
           <a:prstGeom prst="roundRect">
@@ -4924,25 +5423,99 @@
           </a:p>
         </p:txBody>
       </p:sp>
+      <p:sp>
+        <p:nvSpPr>
+          <p:cNvPr id="11" name="Retângulo de cantos arredondados 111">
+            <a:extLst>
+              <a:ext uri="{FF2B5EF4-FFF2-40B4-BE49-F238E27FC236}">
+                <a16:creationId xmlns:a16="http://schemas.microsoft.com/office/drawing/2014/main" id="{DB0D236C-3476-4EA5-8F13-60708BB330A7}"/>
+              </a:ext>
+            </a:extLst>
+          </p:cNvPr>
+          <p:cNvSpPr/>
+          <p:nvPr/>
+        </p:nvSpPr>
+        <p:spPr>
+          <a:xfrm>
+            <a:off x="9414212" y="4706431"/>
+            <a:ext cx="1368195" cy="670931"/>
+          </a:xfrm>
+          <a:prstGeom prst="roundRect">
+            <a:avLst/>
+          </a:prstGeom>
+          <a:scene3d>
+            <a:camera prst="orthographicFront">
+              <a:rot lat="0" lon="0" rev="0"/>
+            </a:camera>
+            <a:lightRig rig="contrasting" dir="t">
+              <a:rot lat="0" lon="0" rev="1200000"/>
+            </a:lightRig>
+          </a:scene3d>
+          <a:sp3d contourW="19050" prstMaterial="metal">
+            <a:bevelT w="88900" h="203200"/>
+            <a:bevelB w="165100" h="254000"/>
+          </a:sp3d>
+        </p:spPr>
+        <p:style>
+          <a:lnRef idx="0">
+            <a:schemeClr val="lt1">
+              <a:hueOff val="0"/>
+              <a:satOff val="0"/>
+              <a:lumOff val="0"/>
+              <a:alphaOff val="0"/>
+            </a:schemeClr>
+          </a:lnRef>
+          <a:fillRef idx="1">
+            <a:schemeClr val="accent6">
+              <a:hueOff val="0"/>
+              <a:satOff val="0"/>
+              <a:lumOff val="0"/>
+              <a:alphaOff val="0"/>
+            </a:schemeClr>
+          </a:fillRef>
+          <a:effectRef idx="1">
+            <a:schemeClr val="accent6">
+              <a:hueOff val="0"/>
+              <a:satOff val="0"/>
+              <a:lumOff val="0"/>
+              <a:alphaOff val="0"/>
+            </a:schemeClr>
+          </a:effectRef>
+          <a:fontRef idx="minor">
+            <a:schemeClr val="lt1"/>
+          </a:fontRef>
+        </p:style>
+        <p:txBody>
+          <a:bodyPr rtlCol="0" anchor="ctr"/>
+          <a:lstStyle/>
+          <a:p>
+            <a:pPr algn="ctr"/>
+            <a:r>
+              <a:rPr lang="pt-BR" sz="1400" dirty="0"/>
+              <a:t>Tratar pegar o dinheiro de volta</a:t>
+            </a:r>
+          </a:p>
+        </p:txBody>
+      </p:sp>
       <p:cxnSp>
         <p:nvCxnSpPr>
-          <p:cNvPr id="14" name="Conector reto 13">
-            <a:extLst>
-              <a:ext uri="{FF2B5EF4-FFF2-40B4-BE49-F238E27FC236}">
-                <a16:creationId xmlns:a16="http://schemas.microsoft.com/office/drawing/2014/main" id="{95039765-6875-4DE2-9C6C-43927750AC07}"/>
+          <p:cNvPr id="16" name="Conector reto 15">
+            <a:extLst>
+              <a:ext uri="{FF2B5EF4-FFF2-40B4-BE49-F238E27FC236}">
+                <a16:creationId xmlns:a16="http://schemas.microsoft.com/office/drawing/2014/main" id="{03D27943-87D3-43D8-A0B6-AD00FA5A6010}"/>
               </a:ext>
             </a:extLst>
           </p:cNvPr>
           <p:cNvCxnSpPr>
             <a:cxnSpLocks/>
-            <a:endCxn id="2" idx="0"/>
+            <a:stCxn id="11" idx="0"/>
           </p:cNvCxnSpPr>
           <p:nvPr/>
         </p:nvCxnSpPr>
         <p:spPr>
-          <a:xfrm>
-            <a:off x="8639175" y="4025896"/>
-            <a:ext cx="1160997" cy="680743"/>
+          <a:xfrm flipH="1" flipV="1">
+            <a:off x="8614220" y="4021095"/>
+            <a:ext cx="1484090" cy="685336"/>
           </a:xfrm>
           <a:prstGeom prst="line">
             <a:avLst/>
@@ -4967,7 +5540,7 @@
     </p:spTree>
     <p:extLst>
       <p:ext uri="{BB962C8B-B14F-4D97-AF65-F5344CB8AC3E}">
-        <p14:creationId xmlns:p14="http://schemas.microsoft.com/office/powerpoint/2010/main" val="2692459707"/>
+        <p14:creationId xmlns:p14="http://schemas.microsoft.com/office/powerpoint/2010/main" val="2737864566"/>
       </p:ext>
     </p:extLst>
   </p:cSld>
@@ -4977,7 +5550,7 @@
 </p:sld>
 </file>
 
-<file path=ppt/slides/slide4.xml><?xml version="1.0" encoding="utf-8"?>
+<file path=ppt/slides/slide5.xml><?xml version="1.0" encoding="utf-8"?>
 <p:sld xmlns:a="http://schemas.openxmlformats.org/drawingml/2006/main" xmlns:r="http://schemas.openxmlformats.org/officeDocument/2006/relationships" xmlns:p="http://schemas.openxmlformats.org/presentationml/2006/main">
   <p:cSld>
     <p:spTree>

</xml_diff>